<commit_message>
Edited the presentation and my slides a little
Issues my email address in the images for misp. Added a total row in the issues side.
</commit_message>
<xml_diff>
--- a/Class-Presentation/MISP_Presentation.pptx
+++ b/Class-Presentation/MISP_Presentation.pptx
@@ -3631,7 +3631,7 @@
           <a:p>
             <a:r>
               <a:rPr lang="en-US" dirty="0"/>
-              <a:t>Automated Scan Findings</a:t>
+              <a:t>Automated Scans</a:t>
             </a:r>
           </a:p>
         </p:txBody>
@@ -3780,7 +3780,7 @@
           <a:p>
             <a:r>
               <a:rPr lang="en-US" dirty="0"/>
-              <a:t>Automated Scan Findings </a:t>
+              <a:t>Automated Scans</a:t>
             </a:r>
           </a:p>
         </p:txBody>
@@ -3971,14 +3971,14 @@
           <p:nvPr>
             <p:extLst>
               <p:ext uri="{D42A27DB-BD31-4B8C-83A1-F6EECF244321}">
-                <p14:modId xmlns:p14="http://schemas.microsoft.com/office/powerpoint/2010/main" val="2256827840"/>
+                <p14:modId xmlns:p14="http://schemas.microsoft.com/office/powerpoint/2010/main" val="577205920"/>
               </p:ext>
             </p:extLst>
           </p:nvPr>
         </p:nvGraphicFramePr>
         <p:xfrm>
           <a:off x="1274618" y="3551381"/>
-          <a:ext cx="6096000" cy="1483360"/>
+          <a:ext cx="6096000" cy="1854200"/>
         </p:xfrm>
         <a:graphic>
           <a:graphicData uri="http://schemas.openxmlformats.org/drawingml/2006/table">
@@ -3987,17 +3987,24 @@
                 <a:tableStyleId>{5C22544A-7EE6-4342-B048-85BDC9FD1C3A}</a:tableStyleId>
               </a:tblPr>
               <a:tblGrid>
-                <a:gridCol w="3048000">
+                <a:gridCol w="2032000">
                   <a:extLst>
                     <a:ext uri="{9D8B030D-6E8A-4147-A177-3AD203B41FA5}">
                       <a16:colId xmlns:a16="http://schemas.microsoft.com/office/drawing/2014/main" val="157213832"/>
                     </a:ext>
                   </a:extLst>
                 </a:gridCol>
-                <a:gridCol w="3048000">
+                <a:gridCol w="2032000">
                   <a:extLst>
                     <a:ext uri="{9D8B030D-6E8A-4147-A177-3AD203B41FA5}">
                       <a16:colId xmlns:a16="http://schemas.microsoft.com/office/drawing/2014/main" val="4139480091"/>
+                    </a:ext>
+                  </a:extLst>
+                </a:gridCol>
+                <a:gridCol w="2032000">
+                  <a:extLst>
+                    <a:ext uri="{9D8B030D-6E8A-4147-A177-3AD203B41FA5}">
+                      <a16:colId xmlns:a16="http://schemas.microsoft.com/office/drawing/2014/main" val="529063610"/>
                     </a:ext>
                   </a:extLst>
                 </a:gridCol>
@@ -4092,6 +4099,61 @@
                       <a:noFill/>
                     </a:lnL>
                     <a:lnR w="12700" cap="flat" cmpd="sng" algn="ctr">
+                      <a:noFill/>
+                      <a:prstDash val="solid"/>
+                      <a:round/>
+                      <a:headEnd type="none" w="med" len="med"/>
+                      <a:tailEnd type="none" w="med" len="med"/>
+                    </a:lnR>
+                    <a:lnT w="12700" cap="flat" cmpd="sng" algn="ctr">
+                      <a:solidFill>
+                        <a:schemeClr val="tx1"/>
+                      </a:solidFill>
+                      <a:prstDash val="solid"/>
+                      <a:round/>
+                      <a:headEnd type="none" w="med" len="med"/>
+                      <a:tailEnd type="none" w="med" len="med"/>
+                    </a:lnT>
+                    <a:lnB w="38100" cmpd="sng">
+                      <a:noFill/>
+                    </a:lnB>
+                    <a:lnTlToBr w="12700" cmpd="sng">
+                      <a:noFill/>
+                      <a:prstDash val="solid"/>
+                    </a:lnTlToBr>
+                    <a:lnBlToTr w="12700" cmpd="sng">
+                      <a:noFill/>
+                      <a:prstDash val="solid"/>
+                    </a:lnBlToTr>
+                    <a:solidFill>
+                      <a:srgbClr val="E9EDF4"/>
+                    </a:solidFill>
+                  </a:tcPr>
+                </a:tc>
+                <a:tc>
+                  <a:txBody>
+                    <a:bodyPr/>
+                    <a:lstStyle/>
+                    <a:p>
+                      <a:pPr marL="0" algn="l" defTabSz="457200" rtl="0" eaLnBrk="1" fontAlgn="t" latinLnBrk="0" hangingPunct="1"/>
+                      <a:r>
+                        <a:rPr lang="en-US" sz="1800" b="0" kern="1200" dirty="0">
+                          <a:solidFill>
+                            <a:schemeClr val="tx1"/>
+                          </a:solidFill>
+                          <a:latin typeface="+mn-lt"/>
+                          <a:ea typeface="+mn-ea"/>
+                          <a:cs typeface="+mn-cs"/>
+                        </a:rPr>
+                        <a:t>79.11%</a:t>
+                      </a:r>
+                    </a:p>
+                  </a:txBody>
+                  <a:tcPr marL="6350" marR="6350" marT="6350" marB="0">
+                    <a:lnL w="12700" cmpd="sng">
+                      <a:noFill/>
+                    </a:lnL>
+                    <a:lnR w="12700" cap="flat" cmpd="sng" algn="ctr">
                       <a:solidFill>
                         <a:schemeClr val="tx1"/>
                       </a:solidFill>
@@ -4192,6 +4254,52 @@
                       <a:noFill/>
                     </a:lnL>
                     <a:lnR w="12700" cap="flat" cmpd="sng" algn="ctr">
+                      <a:noFill/>
+                      <a:prstDash val="solid"/>
+                      <a:round/>
+                      <a:headEnd type="none" w="med" len="med"/>
+                      <a:tailEnd type="none" w="med" len="med"/>
+                    </a:lnR>
+                    <a:lnT w="38100" cmpd="sng">
+                      <a:noFill/>
+                    </a:lnT>
+                    <a:lnB w="12700" cmpd="sng">
+                      <a:noFill/>
+                    </a:lnB>
+                    <a:lnTlToBr w="12700" cmpd="sng">
+                      <a:noFill/>
+                      <a:prstDash val="solid"/>
+                    </a:lnTlToBr>
+                    <a:lnBlToTr w="12700" cmpd="sng">
+                      <a:noFill/>
+                      <a:prstDash val="solid"/>
+                    </a:lnBlToTr>
+                  </a:tcPr>
+                </a:tc>
+                <a:tc>
+                  <a:txBody>
+                    <a:bodyPr/>
+                    <a:lstStyle/>
+                    <a:p>
+                      <a:pPr marL="0" algn="l" defTabSz="457200" rtl="0" eaLnBrk="1" fontAlgn="t" latinLnBrk="0" hangingPunct="1"/>
+                      <a:r>
+                        <a:rPr lang="en-US" sz="1800" b="0" kern="1200" dirty="0">
+                          <a:solidFill>
+                            <a:schemeClr val="tx1"/>
+                          </a:solidFill>
+                          <a:latin typeface="+mn-lt"/>
+                          <a:ea typeface="+mn-ea"/>
+                          <a:cs typeface="+mn-cs"/>
+                        </a:rPr>
+                        <a:t>17.81%</a:t>
+                      </a:r>
+                    </a:p>
+                  </a:txBody>
+                  <a:tcPr marL="6350" marR="6350" marT="6350" marB="0">
+                    <a:lnL w="12700" cmpd="sng">
+                      <a:noFill/>
+                    </a:lnL>
+                    <a:lnR w="12700" cap="flat" cmpd="sng" algn="ctr">
                       <a:solidFill>
                         <a:schemeClr val="tx1"/>
                       </a:solidFill>
@@ -4275,6 +4383,52 @@
                     </a:p>
                   </a:txBody>
                   <a:tcPr>
+                    <a:lnL w="12700" cmpd="sng">
+                      <a:noFill/>
+                    </a:lnL>
+                    <a:lnR w="12700" cap="flat" cmpd="sng" algn="ctr">
+                      <a:noFill/>
+                      <a:prstDash val="solid"/>
+                      <a:round/>
+                      <a:headEnd type="none" w="med" len="med"/>
+                      <a:tailEnd type="none" w="med" len="med"/>
+                    </a:lnR>
+                    <a:lnT w="12700" cmpd="sng">
+                      <a:noFill/>
+                    </a:lnT>
+                    <a:lnB w="12700" cmpd="sng">
+                      <a:noFill/>
+                    </a:lnB>
+                    <a:lnTlToBr w="12700" cmpd="sng">
+                      <a:noFill/>
+                      <a:prstDash val="solid"/>
+                    </a:lnTlToBr>
+                    <a:lnBlToTr w="12700" cmpd="sng">
+                      <a:noFill/>
+                      <a:prstDash val="solid"/>
+                    </a:lnBlToTr>
+                  </a:tcPr>
+                </a:tc>
+                <a:tc>
+                  <a:txBody>
+                    <a:bodyPr/>
+                    <a:lstStyle/>
+                    <a:p>
+                      <a:pPr marL="0" algn="l" defTabSz="457200" rtl="0" eaLnBrk="1" fontAlgn="t" latinLnBrk="0" hangingPunct="1"/>
+                      <a:r>
+                        <a:rPr lang="en-US" sz="1800" b="0" kern="1200" dirty="0">
+                          <a:solidFill>
+                            <a:schemeClr val="tx1"/>
+                          </a:solidFill>
+                          <a:latin typeface="+mn-lt"/>
+                          <a:ea typeface="+mn-ea"/>
+                          <a:cs typeface="+mn-cs"/>
+                        </a:rPr>
+                        <a:t>2.52%</a:t>
+                      </a:r>
+                    </a:p>
+                  </a:txBody>
+                  <a:tcPr marL="6350" marR="6350" marT="6350" marB="0">
                     <a:lnL w="12700" cmpd="sng">
                       <a:noFill/>
                     </a:lnL>
@@ -4339,9 +4493,7 @@
                       <a:noFill/>
                     </a:lnT>
                     <a:lnB w="12700" cap="flat" cmpd="sng" algn="ctr">
-                      <a:solidFill>
-                        <a:schemeClr val="tx1"/>
-                      </a:solidFill>
+                      <a:noFill/>
                       <a:prstDash val="solid"/>
                       <a:round/>
                       <a:headEnd type="none" w="med" len="med"/>
@@ -4373,6 +4525,56 @@
                       <a:noFill/>
                     </a:lnL>
                     <a:lnR w="12700" cap="flat" cmpd="sng" algn="ctr">
+                      <a:noFill/>
+                      <a:prstDash val="solid"/>
+                      <a:round/>
+                      <a:headEnd type="none" w="med" len="med"/>
+                      <a:tailEnd type="none" w="med" len="med"/>
+                    </a:lnR>
+                    <a:lnT w="12700" cmpd="sng">
+                      <a:noFill/>
+                    </a:lnT>
+                    <a:lnB w="12700" cap="flat" cmpd="sng" algn="ctr">
+                      <a:noFill/>
+                      <a:prstDash val="solid"/>
+                      <a:round/>
+                      <a:headEnd type="none" w="med" len="med"/>
+                      <a:tailEnd type="none" w="med" len="med"/>
+                    </a:lnB>
+                    <a:lnTlToBr w="12700" cmpd="sng">
+                      <a:noFill/>
+                      <a:prstDash val="solid"/>
+                    </a:lnTlToBr>
+                    <a:lnBlToTr w="12700" cmpd="sng">
+                      <a:noFill/>
+                      <a:prstDash val="solid"/>
+                    </a:lnBlToTr>
+                  </a:tcPr>
+                </a:tc>
+                <a:tc>
+                  <a:txBody>
+                    <a:bodyPr/>
+                    <a:lstStyle/>
+                    <a:p>
+                      <a:pPr marL="0" algn="l" defTabSz="457200" rtl="0" eaLnBrk="1" fontAlgn="t" latinLnBrk="0" hangingPunct="1"/>
+                      <a:r>
+                        <a:rPr lang="en-US" sz="1800" b="0" kern="1200" dirty="0">
+                          <a:solidFill>
+                            <a:schemeClr val="tx1"/>
+                          </a:solidFill>
+                          <a:latin typeface="+mn-lt"/>
+                          <a:ea typeface="+mn-ea"/>
+                          <a:cs typeface="+mn-cs"/>
+                        </a:rPr>
+                        <a:t>0.56%</a:t>
+                      </a:r>
+                    </a:p>
+                  </a:txBody>
+                  <a:tcPr marL="6350" marR="6350" marT="6350" marB="0">
+                    <a:lnL w="12700" cmpd="sng">
+                      <a:noFill/>
+                    </a:lnL>
+                    <a:lnR w="12700" cap="flat" cmpd="sng" algn="ctr">
                       <a:solidFill>
                         <a:schemeClr val="tx1"/>
                       </a:solidFill>
@@ -4380,6 +4582,57 @@
                       <a:round/>
                       <a:headEnd type="none" w="med" len="med"/>
                       <a:tailEnd type="none" w="med" len="med"/>
+                    </a:lnR>
+                    <a:lnT w="12700" cmpd="sng">
+                      <a:noFill/>
+                    </a:lnT>
+                    <a:lnB w="12700" cap="flat" cmpd="sng" algn="ctr">
+                      <a:noFill/>
+                      <a:prstDash val="solid"/>
+                      <a:round/>
+                      <a:headEnd type="none" w="med" len="med"/>
+                      <a:tailEnd type="none" w="med" len="med"/>
+                    </a:lnB>
+                    <a:lnTlToBr w="12700" cmpd="sng">
+                      <a:noFill/>
+                      <a:prstDash val="solid"/>
+                    </a:lnTlToBr>
+                    <a:lnBlToTr w="12700" cmpd="sng">
+                      <a:noFill/>
+                      <a:prstDash val="solid"/>
+                    </a:lnBlToTr>
+                  </a:tcPr>
+                </a:tc>
+                <a:extLst>
+                  <a:ext uri="{0D108BD9-81ED-4DB2-BD59-A6C34878D82A}">
+                    <a16:rowId xmlns:a16="http://schemas.microsoft.com/office/drawing/2014/main" val="2468813746"/>
+                  </a:ext>
+                </a:extLst>
+              </a:tr>
+              <a:tr h="370840">
+                <a:tc>
+                  <a:txBody>
+                    <a:bodyPr/>
+                    <a:lstStyle/>
+                    <a:p>
+                      <a:r>
+                        <a:rPr lang="en-US" b="1" dirty="0"/>
+                        <a:t>Totals</a:t>
+                      </a:r>
+                    </a:p>
+                  </a:txBody>
+                  <a:tcPr>
+                    <a:lnL w="12700" cap="flat" cmpd="sng" algn="ctr">
+                      <a:solidFill>
+                        <a:schemeClr val="tx1"/>
+                      </a:solidFill>
+                      <a:prstDash val="solid"/>
+                      <a:round/>
+                      <a:headEnd type="none" w="med" len="med"/>
+                      <a:tailEnd type="none" w="med" len="med"/>
+                    </a:lnL>
+                    <a:lnR w="12700" cmpd="sng">
+                      <a:noFill/>
                     </a:lnR>
                     <a:lnT w="12700" cmpd="sng">
                       <a:noFill/>
@@ -4403,9 +4656,107 @@
                     </a:lnBlToTr>
                   </a:tcPr>
                 </a:tc>
+                <a:tc>
+                  <a:txBody>
+                    <a:bodyPr/>
+                    <a:lstStyle/>
+                    <a:p>
+                      <a:r>
+                        <a:rPr lang="en-US" b="1" dirty="0"/>
+                        <a:t>22,207</a:t>
+                      </a:r>
+                    </a:p>
+                  </a:txBody>
+                  <a:tcPr>
+                    <a:lnL w="12700" cmpd="sng">
+                      <a:noFill/>
+                    </a:lnL>
+                    <a:lnR w="12700" cap="flat" cmpd="sng" algn="ctr">
+                      <a:noFill/>
+                      <a:prstDash val="solid"/>
+                      <a:round/>
+                      <a:headEnd type="none" w="med" len="med"/>
+                      <a:tailEnd type="none" w="med" len="med"/>
+                    </a:lnR>
+                    <a:lnT w="12700" cmpd="sng">
+                      <a:noFill/>
+                    </a:lnT>
+                    <a:lnB w="12700" cap="flat" cmpd="sng" algn="ctr">
+                      <a:solidFill>
+                        <a:schemeClr val="tx1"/>
+                      </a:solidFill>
+                      <a:prstDash val="solid"/>
+                      <a:round/>
+                      <a:headEnd type="none" w="med" len="med"/>
+                      <a:tailEnd type="none" w="med" len="med"/>
+                    </a:lnB>
+                    <a:lnTlToBr w="12700" cmpd="sng">
+                      <a:noFill/>
+                      <a:prstDash val="solid"/>
+                    </a:lnTlToBr>
+                    <a:lnBlToTr w="12700" cmpd="sng">
+                      <a:noFill/>
+                      <a:prstDash val="solid"/>
+                    </a:lnBlToTr>
+                  </a:tcPr>
+                </a:tc>
+                <a:tc>
+                  <a:txBody>
+                    <a:bodyPr/>
+                    <a:lstStyle/>
+                    <a:p>
+                      <a:pPr marL="0" algn="l" defTabSz="457200" rtl="0" eaLnBrk="1" fontAlgn="t" latinLnBrk="0" hangingPunct="1"/>
+                      <a:r>
+                        <a:rPr lang="en-US" sz="1800" b="1" kern="1200" dirty="0">
+                          <a:solidFill>
+                            <a:schemeClr val="tx1"/>
+                          </a:solidFill>
+                          <a:latin typeface="+mn-lt"/>
+                          <a:ea typeface="+mn-ea"/>
+                          <a:cs typeface="+mn-cs"/>
+                        </a:rPr>
+                        <a:t>100.00%</a:t>
+                      </a:r>
+                    </a:p>
+                  </a:txBody>
+                  <a:tcPr marL="6350" marR="6350" marT="6350" marB="0">
+                    <a:lnL w="12700" cmpd="sng">
+                      <a:noFill/>
+                    </a:lnL>
+                    <a:lnR w="12700" cap="flat" cmpd="sng" algn="ctr">
+                      <a:solidFill>
+                        <a:schemeClr val="tx1"/>
+                      </a:solidFill>
+                      <a:prstDash val="solid"/>
+                      <a:round/>
+                      <a:headEnd type="none" w="med" len="med"/>
+                      <a:tailEnd type="none" w="med" len="med"/>
+                    </a:lnR>
+                    <a:lnT w="12700" cmpd="sng">
+                      <a:noFill/>
+                    </a:lnT>
+                    <a:lnB w="12700" cap="flat" cmpd="sng" algn="ctr">
+                      <a:solidFill>
+                        <a:schemeClr val="tx1"/>
+                      </a:solidFill>
+                      <a:prstDash val="solid"/>
+                      <a:round/>
+                      <a:headEnd type="none" w="med" len="med"/>
+                      <a:tailEnd type="none" w="med" len="med"/>
+                    </a:lnB>
+                    <a:lnTlToBr w="12700" cmpd="sng">
+                      <a:noFill/>
+                      <a:prstDash val="solid"/>
+                    </a:lnTlToBr>
+                    <a:lnBlToTr w="12700" cmpd="sng">
+                      <a:noFill/>
+                      <a:prstDash val="solid"/>
+                    </a:lnBlToTr>
+                  </a:tcPr>
+                </a:tc>
                 <a:extLst>
                   <a:ext uri="{0D108BD9-81ED-4DB2-BD59-A6C34878D82A}">
-                    <a16:rowId xmlns:a16="http://schemas.microsoft.com/office/drawing/2014/main" val="2468813746"/>
+                    <a16:rowId xmlns:a16="http://schemas.microsoft.com/office/drawing/2014/main" val="1199106107"/>
                   </a:ext>
                 </a:extLst>
               </a:tr>
@@ -4670,7 +5021,13 @@
       </p:sp>
       <p:pic>
         <p:nvPicPr>
-          <p:cNvPr id="4" name="Content Placeholder 3"/>
+          <p:cNvPr id="7" name="Content Placeholder 6">
+            <a:extLst>
+              <a:ext uri="{FF2B5EF4-FFF2-40B4-BE49-F238E27FC236}">
+                <a16:creationId xmlns:a16="http://schemas.microsoft.com/office/drawing/2014/main" id="{AFC19566-A560-47A8-BC03-34B23A843167}"/>
+              </a:ext>
+            </a:extLst>
+          </p:cNvPr>
           <p:cNvPicPr>
             <a:picLocks noGrp="1" noChangeAspect="1"/>
           </p:cNvPicPr>
@@ -4679,21 +5036,15 @@
           </p:nvPr>
         </p:nvPicPr>
         <p:blipFill>
-          <a:blip r:embed="rId2">
-            <a:extLst>
-              <a:ext uri="{28A0092B-C50C-407E-A947-70E740481C1C}">
-                <a14:useLocalDpi xmlns:a14="http://schemas.microsoft.com/office/drawing/2010/main" val="0"/>
-              </a:ext>
-            </a:extLst>
-          </a:blip>
+          <a:blip r:embed="rId2"/>
           <a:stretch>
             <a:fillRect/>
           </a:stretch>
         </p:blipFill>
         <p:spPr>
           <a:xfrm>
-            <a:off x="457200" y="2228624"/>
-            <a:ext cx="8229600" cy="3658561"/>
+            <a:off x="457200" y="2421365"/>
+            <a:ext cx="8229600" cy="3660484"/>
           </a:xfrm>
         </p:spPr>
       </p:pic>
@@ -4751,7 +5102,13 @@
       </p:sp>
       <p:pic>
         <p:nvPicPr>
-          <p:cNvPr id="4" name="Content Placeholder 3"/>
+          <p:cNvPr id="7" name="Content Placeholder 6">
+            <a:extLst>
+              <a:ext uri="{FF2B5EF4-FFF2-40B4-BE49-F238E27FC236}">
+                <a16:creationId xmlns:a16="http://schemas.microsoft.com/office/drawing/2014/main" id="{1A9903EE-D591-437E-A0CE-05ECD7665FD4}"/>
+              </a:ext>
+            </a:extLst>
+          </p:cNvPr>
           <p:cNvPicPr>
             <a:picLocks noGrp="1" noChangeAspect="1"/>
           </p:cNvPicPr>
@@ -4760,21 +5117,15 @@
           </p:nvPr>
         </p:nvPicPr>
         <p:blipFill>
-          <a:blip r:embed="rId2">
-            <a:extLst>
-              <a:ext uri="{28A0092B-C50C-407E-A947-70E740481C1C}">
-                <a14:useLocalDpi xmlns:a14="http://schemas.microsoft.com/office/drawing/2010/main" val="0"/>
-              </a:ext>
-            </a:extLst>
-          </a:blip>
+          <a:blip r:embed="rId2"/>
           <a:stretch>
             <a:fillRect/>
           </a:stretch>
         </p:blipFill>
         <p:spPr>
           <a:xfrm>
-            <a:off x="457200" y="2228624"/>
-            <a:ext cx="8229600" cy="3658561"/>
+            <a:off x="457200" y="2431197"/>
+            <a:ext cx="8229600" cy="3660484"/>
           </a:xfrm>
         </p:spPr>
       </p:pic>
@@ -4832,7 +5183,13 @@
       </p:sp>
       <p:pic>
         <p:nvPicPr>
-          <p:cNvPr id="4" name="Content Placeholder 3"/>
+          <p:cNvPr id="7" name="Content Placeholder 6">
+            <a:extLst>
+              <a:ext uri="{FF2B5EF4-FFF2-40B4-BE49-F238E27FC236}">
+                <a16:creationId xmlns:a16="http://schemas.microsoft.com/office/drawing/2014/main" id="{D63AC6A8-BD13-4224-BDCC-920B8313969A}"/>
+              </a:ext>
+            </a:extLst>
+          </p:cNvPr>
           <p:cNvPicPr>
             <a:picLocks noGrp="1" noChangeAspect="1"/>
           </p:cNvPicPr>
@@ -4841,21 +5198,15 @@
           </p:nvPr>
         </p:nvPicPr>
         <p:blipFill>
-          <a:blip r:embed="rId2">
-            <a:extLst>
-              <a:ext uri="{28A0092B-C50C-407E-A947-70E740481C1C}">
-                <a14:useLocalDpi xmlns:a14="http://schemas.microsoft.com/office/drawing/2010/main" val="0"/>
-              </a:ext>
-            </a:extLst>
-          </a:blip>
+          <a:blip r:embed="rId2"/>
           <a:stretch>
             <a:fillRect/>
           </a:stretch>
         </p:blipFill>
         <p:spPr>
           <a:xfrm>
-            <a:off x="457200" y="2228624"/>
-            <a:ext cx="8229600" cy="3658561"/>
+            <a:off x="457200" y="2362371"/>
+            <a:ext cx="8229600" cy="3660484"/>
           </a:xfrm>
         </p:spPr>
       </p:pic>

</xml_diff>

<commit_message>
Added contribution & questions slides
</commit_message>
<xml_diff>
--- a/Class-Presentation/MISP_Presentation.pptx
+++ b/Class-Presentation/MISP_Presentation.pptx
@@ -5,7 +5,7 @@
     <p:sldMasterId id="2147483672" r:id="rId1"/>
   </p:sldMasterIdLst>
   <p:notesMasterIdLst>
-    <p:notesMasterId r:id="rId15"/>
+    <p:notesMasterId r:id="rId17"/>
   </p:notesMasterIdLst>
   <p:sldIdLst>
     <p:sldId id="256" r:id="rId2"/>
@@ -21,6 +21,8 @@
     <p:sldId id="266" r:id="rId12"/>
     <p:sldId id="267" r:id="rId13"/>
     <p:sldId id="268" r:id="rId14"/>
+    <p:sldId id="271" r:id="rId15"/>
+    <p:sldId id="270" r:id="rId16"/>
   </p:sldIdLst>
   <p:sldSz cx="9144000" cy="6858000" type="screen4x3"/>
   <p:notesSz cx="6858000" cy="9144000"/>
@@ -3503,6 +3505,13 @@
   <p:clrMapOvr>
     <a:masterClrMapping/>
   </p:clrMapOvr>
+  <p:timing>
+    <p:tnLst>
+      <p:par>
+        <p:cTn id="1" dur="indefinite" restart="never" nodeType="tmRoot"/>
+      </p:par>
+    </p:tnLst>
+  </p:timing>
 </p:sld>
 </file>
 
@@ -4777,6 +4786,212 @@
 </p:sld>
 </file>
 
+<file path=ppt/slides/slide14.xml><?xml version="1.0" encoding="utf-8"?>
+<p:sld xmlns:a="http://schemas.openxmlformats.org/drawingml/2006/main" xmlns:r="http://schemas.openxmlformats.org/officeDocument/2006/relationships" xmlns:p="http://schemas.openxmlformats.org/presentationml/2006/main">
+  <p:cSld>
+    <p:spTree>
+      <p:nvGrpSpPr>
+        <p:cNvPr id="1" name=""/>
+        <p:cNvGrpSpPr/>
+        <p:nvPr/>
+      </p:nvGrpSpPr>
+      <p:grpSpPr>
+        <a:xfrm>
+          <a:off x="0" y="0"/>
+          <a:ext cx="0" cy="0"/>
+          <a:chOff x="0" y="0"/>
+          <a:chExt cx="0" cy="0"/>
+        </a:xfrm>
+      </p:grpSpPr>
+      <p:sp>
+        <p:nvSpPr>
+          <p:cNvPr id="2" name="Title 1"/>
+          <p:cNvSpPr>
+            <a:spLocks noGrp="1"/>
+          </p:cNvSpPr>
+          <p:nvPr>
+            <p:ph type="title"/>
+          </p:nvPr>
+        </p:nvSpPr>
+        <p:spPr/>
+        <p:txBody>
+          <a:bodyPr/>
+          <a:lstStyle/>
+          <a:p>
+            <a:r>
+              <a:rPr lang="en-US" dirty="0"/>
+              <a:t>Contributions to the original project</a:t>
+            </a:r>
+            <a:endParaRPr lang="en-US" dirty="0"/>
+          </a:p>
+        </p:txBody>
+      </p:sp>
+      <p:sp>
+        <p:nvSpPr>
+          <p:cNvPr id="3" name="Content Placeholder 2"/>
+          <p:cNvSpPr>
+            <a:spLocks noGrp="1"/>
+          </p:cNvSpPr>
+          <p:nvPr>
+            <p:ph idx="1"/>
+          </p:nvPr>
+        </p:nvSpPr>
+        <p:spPr/>
+        <p:txBody>
+          <a:bodyPr>
+            <a:normAutofit lnSpcReduction="10000"/>
+          </a:bodyPr>
+          <a:lstStyle/>
+          <a:p>
+            <a:r>
+              <a:rPr lang="en-US" dirty="0" smtClean="0"/>
+              <a:t>The install script </a:t>
+            </a:r>
+            <a:r>
+              <a:rPr lang="en-US" dirty="0" err="1" smtClean="0"/>
+              <a:t>composer.phar</a:t>
+            </a:r>
+            <a:r>
+              <a:rPr lang="en-US" dirty="0" smtClean="0"/>
+              <a:t> </a:t>
+            </a:r>
+            <a:r>
+              <a:rPr lang="en-US" dirty="0"/>
+              <a:t>tries to create a </a:t>
+            </a:r>
+            <a:r>
+              <a:rPr lang="en-US" dirty="0" smtClean="0"/>
+              <a:t>cache </a:t>
+            </a:r>
+            <a:r>
+              <a:rPr lang="en-US" dirty="0"/>
+              <a:t>directory in the user's home directory which www-run doesn't have </a:t>
+            </a:r>
+            <a:r>
+              <a:rPr lang="en-US" dirty="0" smtClean="0"/>
+              <a:t>permission</a:t>
+            </a:r>
+          </a:p>
+          <a:p>
+            <a:endParaRPr lang="en-US" dirty="0"/>
+          </a:p>
+          <a:p>
+            <a:r>
+              <a:rPr lang="en-US" dirty="0"/>
+              <a:t>Passing the -u &amp; -p parameters are unnecessary because </a:t>
+            </a:r>
+            <a:r>
+              <a:rPr lang="en-US" dirty="0" err="1"/>
+              <a:t>Mariadb</a:t>
+            </a:r>
+            <a:r>
+              <a:rPr lang="en-US" dirty="0"/>
+              <a:t> by default has the root user authenticate using </a:t>
+            </a:r>
+            <a:r>
+              <a:rPr lang="en-US" dirty="0" err="1"/>
+              <a:t>unix_socket</a:t>
+            </a:r>
+            <a:r>
+              <a:rPr lang="en-US" dirty="0"/>
+              <a:t> plugin which relies on the </a:t>
+            </a:r>
+            <a:r>
+              <a:rPr lang="en-US" dirty="0" err="1"/>
+              <a:t>os</a:t>
+            </a:r>
+            <a:r>
+              <a:rPr lang="en-US" dirty="0"/>
+              <a:t> authentication not an entered password.</a:t>
+            </a:r>
+          </a:p>
+        </p:txBody>
+      </p:sp>
+    </p:spTree>
+    <p:extLst>
+      <p:ext uri="{BB962C8B-B14F-4D97-AF65-F5344CB8AC3E}">
+        <p14:creationId xmlns:p14="http://schemas.microsoft.com/office/powerpoint/2010/main" val="2025264363"/>
+      </p:ext>
+    </p:extLst>
+  </p:cSld>
+  <p:clrMapOvr>
+    <a:masterClrMapping/>
+  </p:clrMapOvr>
+</p:sld>
+</file>
+
+<file path=ppt/slides/slide15.xml><?xml version="1.0" encoding="utf-8"?>
+<p:sld xmlns:a="http://schemas.openxmlformats.org/drawingml/2006/main" xmlns:r="http://schemas.openxmlformats.org/officeDocument/2006/relationships" xmlns:p="http://schemas.openxmlformats.org/presentationml/2006/main">
+  <p:cSld>
+    <p:spTree>
+      <p:nvGrpSpPr>
+        <p:cNvPr id="1" name=""/>
+        <p:cNvGrpSpPr/>
+        <p:nvPr/>
+      </p:nvGrpSpPr>
+      <p:grpSpPr>
+        <a:xfrm>
+          <a:off x="0" y="0"/>
+          <a:ext cx="0" cy="0"/>
+          <a:chOff x="0" y="0"/>
+          <a:chExt cx="0" cy="0"/>
+        </a:xfrm>
+      </p:grpSpPr>
+      <p:sp>
+        <p:nvSpPr>
+          <p:cNvPr id="2" name="Title 1"/>
+          <p:cNvSpPr>
+            <a:spLocks noGrp="1"/>
+          </p:cNvSpPr>
+          <p:nvPr>
+            <p:ph type="title"/>
+          </p:nvPr>
+        </p:nvSpPr>
+        <p:spPr/>
+        <p:txBody>
+          <a:bodyPr/>
+          <a:lstStyle/>
+          <a:p>
+            <a:r>
+              <a:rPr lang="en-US" dirty="0" smtClean="0"/>
+              <a:t>Questions?</a:t>
+            </a:r>
+            <a:endParaRPr lang="en-US" dirty="0"/>
+          </a:p>
+        </p:txBody>
+      </p:sp>
+      <p:sp>
+        <p:nvSpPr>
+          <p:cNvPr id="3" name="Content Placeholder 2"/>
+          <p:cNvSpPr>
+            <a:spLocks noGrp="1"/>
+          </p:cNvSpPr>
+          <p:nvPr>
+            <p:ph idx="1"/>
+          </p:nvPr>
+        </p:nvSpPr>
+        <p:spPr/>
+        <p:txBody>
+          <a:bodyPr/>
+          <a:lstStyle/>
+          <a:p>
+            <a:endParaRPr lang="en-US" dirty="0"/>
+          </a:p>
+        </p:txBody>
+      </p:sp>
+    </p:spTree>
+    <p:extLst>
+      <p:ext uri="{BB962C8B-B14F-4D97-AF65-F5344CB8AC3E}">
+        <p14:creationId xmlns:p14="http://schemas.microsoft.com/office/powerpoint/2010/main" val="3819690525"/>
+      </p:ext>
+    </p:extLst>
+  </p:cSld>
+  <p:clrMapOvr>
+    <a:masterClrMapping/>
+  </p:clrMapOvr>
+</p:sld>
+</file>
+
 <file path=ppt/slides/slide2.xml><?xml version="1.0" encoding="utf-8"?>
 <p:sld xmlns:a="http://schemas.openxmlformats.org/drawingml/2006/main" xmlns:r="http://schemas.openxmlformats.org/officeDocument/2006/relationships" xmlns:p="http://schemas.openxmlformats.org/presentationml/2006/main">
   <p:cSld>
@@ -4895,6 +5110,13 @@
   <p:clrMapOvr>
     <a:masterClrMapping/>
   </p:clrMapOvr>
+  <p:timing>
+    <p:tnLst>
+      <p:par>
+        <p:cTn id="1" dur="indefinite" restart="never" nodeType="tmRoot"/>
+      </p:par>
+    </p:tnLst>
+  </p:timing>
 </p:sld>
 </file>
 
@@ -4977,6 +5199,13 @@
   <p:clrMapOvr>
     <a:masterClrMapping/>
   </p:clrMapOvr>
+  <p:timing>
+    <p:tnLst>
+      <p:par>
+        <p:cTn id="1" dur="indefinite" restart="never" nodeType="tmRoot"/>
+      </p:par>
+    </p:tnLst>
+  </p:timing>
 </p:sld>
 </file>
 
@@ -5048,6 +5277,42 @@
           </a:xfrm>
         </p:spPr>
       </p:pic>
+      <p:sp>
+        <p:nvSpPr>
+          <p:cNvPr id="4" name="TextBox 3"/>
+          <p:cNvSpPr txBox="1"/>
+          <p:nvPr/>
+        </p:nvSpPr>
+        <p:spPr>
+          <a:xfrm>
+            <a:off x="3090672" y="6488668"/>
+            <a:ext cx="2250809" cy="369332"/>
+          </a:xfrm>
+          <a:prstGeom prst="rect">
+            <a:avLst/>
+          </a:prstGeom>
+          <a:noFill/>
+        </p:spPr>
+        <p:txBody>
+          <a:bodyPr wrap="square" rtlCol="0">
+            <a:spAutoFit/>
+          </a:bodyPr>
+          <a:lstStyle/>
+          <a:p>
+            <a:r>
+              <a:rPr lang="en-US" dirty="0"/>
+              <a:t>https://</a:t>
+            </a:r>
+            <a:r>
+              <a:rPr lang="en-US" dirty="0">
+                <a:hlinkClick r:id="rId3"/>
+              </a:rPr>
+              <a:t>137.48.187.33</a:t>
+            </a:r>
+            <a:endParaRPr lang="en-US" dirty="0"/>
+          </a:p>
+        </p:txBody>
+      </p:sp>
     </p:spTree>
     <p:extLst>
       <p:ext uri="{BB962C8B-B14F-4D97-AF65-F5344CB8AC3E}">

</xml_diff>